<commit_message>
Updates to the trace-back documentation.
</commit_message>
<xml_diff>
--- a/illustrations_2.pptx
+++ b/illustrations_2.pptx
@@ -105,6 +105,11 @@
       </a:defRPr>
     </a:lvl9pPr>
   </p:defaultTextStyle>
+  <p:extLst>
+    <p:ext uri="{EFAFB233-063F-42B5-8137-9DF3F51BA10A}">
+      <p15:sldGuideLst xmlns:p15="http://schemas.microsoft.com/office/powerpoint/2012/main"/>
+    </p:ext>
+  </p:extLst>
 </p:presentation>
 </file>
 
@@ -2797,7 +2802,7 @@
           <a:p>
             <a:fld id="{F5B3284D-37A7-4E5D-9899-A94D9DB49A9E}" type="datetimeFigureOut">
               <a:rPr lang="en-US" smtClean="0"/>
-              <a:t>2/25/2022</a:t>
+              <a:t>4/18/2022</a:t>
             </a:fld>
             <a:endParaRPr lang="en-US"/>
           </a:p>
@@ -2995,7 +3000,7 @@
           <a:p>
             <a:fld id="{F5B3284D-37A7-4E5D-9899-A94D9DB49A9E}" type="datetimeFigureOut">
               <a:rPr lang="en-US" smtClean="0"/>
-              <a:t>2/25/2022</a:t>
+              <a:t>4/18/2022</a:t>
             </a:fld>
             <a:endParaRPr lang="en-US"/>
           </a:p>
@@ -3203,7 +3208,7 @@
           <a:p>
             <a:fld id="{F5B3284D-37A7-4E5D-9899-A94D9DB49A9E}" type="datetimeFigureOut">
               <a:rPr lang="en-US" smtClean="0"/>
-              <a:t>2/25/2022</a:t>
+              <a:t>4/18/2022</a:t>
             </a:fld>
             <a:endParaRPr lang="en-US"/>
           </a:p>
@@ -3401,7 +3406,7 @@
           <a:p>
             <a:fld id="{F5B3284D-37A7-4E5D-9899-A94D9DB49A9E}" type="datetimeFigureOut">
               <a:rPr lang="en-US" smtClean="0"/>
-              <a:t>2/25/2022</a:t>
+              <a:t>4/18/2022</a:t>
             </a:fld>
             <a:endParaRPr lang="en-US"/>
           </a:p>
@@ -3676,7 +3681,7 @@
           <a:p>
             <a:fld id="{F5B3284D-37A7-4E5D-9899-A94D9DB49A9E}" type="datetimeFigureOut">
               <a:rPr lang="en-US" smtClean="0"/>
-              <a:t>2/25/2022</a:t>
+              <a:t>4/18/2022</a:t>
             </a:fld>
             <a:endParaRPr lang="en-US"/>
           </a:p>
@@ -3941,7 +3946,7 @@
           <a:p>
             <a:fld id="{F5B3284D-37A7-4E5D-9899-A94D9DB49A9E}" type="datetimeFigureOut">
               <a:rPr lang="en-US" smtClean="0"/>
-              <a:t>2/25/2022</a:t>
+              <a:t>4/18/2022</a:t>
             </a:fld>
             <a:endParaRPr lang="en-US"/>
           </a:p>
@@ -4353,7 +4358,7 @@
           <a:p>
             <a:fld id="{F5B3284D-37A7-4E5D-9899-A94D9DB49A9E}" type="datetimeFigureOut">
               <a:rPr lang="en-US" smtClean="0"/>
-              <a:t>2/25/2022</a:t>
+              <a:t>4/18/2022</a:t>
             </a:fld>
             <a:endParaRPr lang="en-US"/>
           </a:p>
@@ -4494,7 +4499,7 @@
           <a:p>
             <a:fld id="{F5B3284D-37A7-4E5D-9899-A94D9DB49A9E}" type="datetimeFigureOut">
               <a:rPr lang="en-US" smtClean="0"/>
-              <a:t>2/25/2022</a:t>
+              <a:t>4/18/2022</a:t>
             </a:fld>
             <a:endParaRPr lang="en-US"/>
           </a:p>
@@ -4607,7 +4612,7 @@
           <a:p>
             <a:fld id="{F5B3284D-37A7-4E5D-9899-A94D9DB49A9E}" type="datetimeFigureOut">
               <a:rPr lang="en-US" smtClean="0"/>
-              <a:t>2/25/2022</a:t>
+              <a:t>4/18/2022</a:t>
             </a:fld>
             <a:endParaRPr lang="en-US"/>
           </a:p>
@@ -4918,7 +4923,7 @@
           <a:p>
             <a:fld id="{F5B3284D-37A7-4E5D-9899-A94D9DB49A9E}" type="datetimeFigureOut">
               <a:rPr lang="en-US" smtClean="0"/>
-              <a:t>2/25/2022</a:t>
+              <a:t>4/18/2022</a:t>
             </a:fld>
             <a:endParaRPr lang="en-US"/>
           </a:p>
@@ -5206,7 +5211,7 @@
           <a:p>
             <a:fld id="{F5B3284D-37A7-4E5D-9899-A94D9DB49A9E}" type="datetimeFigureOut">
               <a:rPr lang="en-US" smtClean="0"/>
-              <a:t>2/25/2022</a:t>
+              <a:t>4/18/2022</a:t>
             </a:fld>
             <a:endParaRPr lang="en-US"/>
           </a:p>
@@ -5447,7 +5452,7 @@
           <a:p>
             <a:fld id="{F5B3284D-37A7-4E5D-9899-A94D9DB49A9E}" type="datetimeFigureOut">
               <a:rPr lang="en-US" smtClean="0"/>
-              <a:t>2/25/2022</a:t>
+              <a:t>4/18/2022</a:t>
             </a:fld>
             <a:endParaRPr lang="en-US"/>
           </a:p>
@@ -6063,7 +6068,14 @@
               <a:pPr algn="ctr"/>
               <a:r>
                 <a:rPr lang="en-US" sz="1050" dirty="0"/>
-                <a:t>Transformation Event</a:t>
+                <a:t>Aggregation</a:t>
+              </a:r>
+              <a:br>
+                <a:rPr lang="en-US" sz="1050" dirty="0"/>
+              </a:br>
+              <a:r>
+                <a:rPr lang="en-US" sz="1050" dirty="0"/>
+                <a:t>Event</a:t>
               </a:r>
             </a:p>
           </p:txBody>
@@ -6132,7 +6144,7 @@
                 <a:pPr algn="ctr"/>
                 <a:r>
                   <a:rPr lang="en-US" dirty="0"/>
-                  <a:t>Breaded Cod Fillet</a:t>
+                  <a:t>Shipping Container</a:t>
                 </a:r>
               </a:p>
             </p:txBody>
@@ -6181,7 +6193,7 @@
                 <a:pPr algn="ctr"/>
                 <a:r>
                   <a:rPr lang="en-US" dirty="0"/>
-                  <a:t>EPC 1</a:t>
+                  <a:t>SSCC 1</a:t>
                 </a:r>
               </a:p>
             </p:txBody>

</xml_diff>